<commit_message>
Basic Component implementation and functionalities
</commit_message>
<xml_diff>
--- a/Angular/Projects/ProductManagement/Requirements of the Product Management Application.pptx
+++ b/Angular/Projects/ProductManagement/Requirements of the Product Management Application.pptx
@@ -7,6 +7,7 @@
   <p:sldIdLst>
     <p:sldId id="256" r:id="rId2"/>
     <p:sldId id="257" r:id="rId3"/>
+    <p:sldId id="258" r:id="rId4"/>
   </p:sldIdLst>
   <p:sldSz cx="12192000" cy="6858000"/>
   <p:notesSz cx="6858000" cy="9144000"/>
@@ -105,6 +106,11 @@
       </a:defRPr>
     </a:lvl9pPr>
   </p:defaultTextStyle>
+  <p:extLst>
+    <p:ext uri="{EFAFB233-063F-42B5-8137-9DF3F51BA10A}">
+      <p15:sldGuideLst xmlns:p15="http://schemas.microsoft.com/office/powerpoint/2012/main"/>
+    </p:ext>
+  </p:extLst>
 </p:presentation>
 </file>
 
@@ -257,7 +263,7 @@
           <a:p>
             <a:fld id="{87160BC7-9621-43F3-A637-386F2B717537}" type="datetimeFigureOut">
               <a:rPr lang="en-IN" smtClean="0"/>
-              <a:t>19-02-2021</a:t>
+              <a:t>21-02-2021</a:t>
             </a:fld>
             <a:endParaRPr lang="en-IN"/>
           </a:p>
@@ -457,7 +463,7 @@
           <a:p>
             <a:fld id="{87160BC7-9621-43F3-A637-386F2B717537}" type="datetimeFigureOut">
               <a:rPr lang="en-IN" smtClean="0"/>
-              <a:t>19-02-2021</a:t>
+              <a:t>21-02-2021</a:t>
             </a:fld>
             <a:endParaRPr lang="en-IN"/>
           </a:p>
@@ -667,7 +673,7 @@
           <a:p>
             <a:fld id="{87160BC7-9621-43F3-A637-386F2B717537}" type="datetimeFigureOut">
               <a:rPr lang="en-IN" smtClean="0"/>
-              <a:t>19-02-2021</a:t>
+              <a:t>21-02-2021</a:t>
             </a:fld>
             <a:endParaRPr lang="en-IN"/>
           </a:p>
@@ -867,7 +873,7 @@
           <a:p>
             <a:fld id="{87160BC7-9621-43F3-A637-386F2B717537}" type="datetimeFigureOut">
               <a:rPr lang="en-IN" smtClean="0"/>
-              <a:t>19-02-2021</a:t>
+              <a:t>21-02-2021</a:t>
             </a:fld>
             <a:endParaRPr lang="en-IN"/>
           </a:p>
@@ -1143,7 +1149,7 @@
           <a:p>
             <a:fld id="{87160BC7-9621-43F3-A637-386F2B717537}" type="datetimeFigureOut">
               <a:rPr lang="en-IN" smtClean="0"/>
-              <a:t>19-02-2021</a:t>
+              <a:t>21-02-2021</a:t>
             </a:fld>
             <a:endParaRPr lang="en-IN"/>
           </a:p>
@@ -1411,7 +1417,7 @@
           <a:p>
             <a:fld id="{87160BC7-9621-43F3-A637-386F2B717537}" type="datetimeFigureOut">
               <a:rPr lang="en-IN" smtClean="0"/>
-              <a:t>19-02-2021</a:t>
+              <a:t>21-02-2021</a:t>
             </a:fld>
             <a:endParaRPr lang="en-IN"/>
           </a:p>
@@ -1826,7 +1832,7 @@
           <a:p>
             <a:fld id="{87160BC7-9621-43F3-A637-386F2B717537}" type="datetimeFigureOut">
               <a:rPr lang="en-IN" smtClean="0"/>
-              <a:t>19-02-2021</a:t>
+              <a:t>21-02-2021</a:t>
             </a:fld>
             <a:endParaRPr lang="en-IN"/>
           </a:p>
@@ -1968,7 +1974,7 @@
           <a:p>
             <a:fld id="{87160BC7-9621-43F3-A637-386F2B717537}" type="datetimeFigureOut">
               <a:rPr lang="en-IN" smtClean="0"/>
-              <a:t>19-02-2021</a:t>
+              <a:t>21-02-2021</a:t>
             </a:fld>
             <a:endParaRPr lang="en-IN"/>
           </a:p>
@@ -2081,7 +2087,7 @@
           <a:p>
             <a:fld id="{87160BC7-9621-43F3-A637-386F2B717537}" type="datetimeFigureOut">
               <a:rPr lang="en-IN" smtClean="0"/>
-              <a:t>19-02-2021</a:t>
+              <a:t>21-02-2021</a:t>
             </a:fld>
             <a:endParaRPr lang="en-IN"/>
           </a:p>
@@ -2394,7 +2400,7 @@
           <a:p>
             <a:fld id="{87160BC7-9621-43F3-A637-386F2B717537}" type="datetimeFigureOut">
               <a:rPr lang="en-IN" smtClean="0"/>
-              <a:t>19-02-2021</a:t>
+              <a:t>21-02-2021</a:t>
             </a:fld>
             <a:endParaRPr lang="en-IN"/>
           </a:p>
@@ -2683,7 +2689,7 @@
           <a:p>
             <a:fld id="{87160BC7-9621-43F3-A637-386F2B717537}" type="datetimeFigureOut">
               <a:rPr lang="en-IN" smtClean="0"/>
-              <a:t>19-02-2021</a:t>
+              <a:t>21-02-2021</a:t>
             </a:fld>
             <a:endParaRPr lang="en-IN"/>
           </a:p>
@@ -2926,7 +2932,7 @@
           <a:p>
             <a:fld id="{87160BC7-9621-43F3-A637-386F2B717537}" type="datetimeFigureOut">
               <a:rPr lang="en-IN" smtClean="0"/>
-              <a:t>19-02-2021</a:t>
+              <a:t>21-02-2021</a:t>
             </a:fld>
             <a:endParaRPr lang="en-IN"/>
           </a:p>
@@ -3474,9 +3480,16 @@
             <p:ph idx="1"/>
           </p:nvPr>
         </p:nvSpPr>
-        <p:spPr/>
-        <p:txBody>
-          <a:bodyPr/>
+        <p:spPr>
+          <a:xfrm>
+            <a:off x="838200" y="1825625"/>
+            <a:ext cx="10515600" cy="4667250"/>
+          </a:xfrm>
+        </p:spPr>
+        <p:txBody>
+          <a:bodyPr>
+            <a:normAutofit/>
+          </a:bodyPr>
           <a:lstStyle/>
           <a:p>
             <a:pPr marL="514350" indent="-514350">
@@ -3535,12 +3548,24 @@
             </a:pPr>
             <a:r>
               <a:rPr lang="en-IN" dirty="0"/>
-              <a:t>Display the price with rupee symbol and correct decimals </a:t>
-            </a:r>
-            <a:r>
-              <a:rPr lang="en-IN"/>
-              <a:t>(2).</a:t>
-            </a:r>
+              <a:t>Display the price with rupee symbol and correct decimals (2).</a:t>
+            </a:r>
+          </a:p>
+          <a:p>
+            <a:pPr marL="514350" indent="-514350">
+              <a:buFont typeface="+mj-lt"/>
+              <a:buAutoNum type="arabicPeriod"/>
+            </a:pPr>
+            <a:r>
+              <a:rPr lang="en-IN" dirty="0"/>
+              <a:t>Implement TABLE HEADER styles</a:t>
+            </a:r>
+          </a:p>
+          <a:p>
+            <a:pPr marL="514350" indent="-514350">
+              <a:buFont typeface="+mj-lt"/>
+              <a:buAutoNum type="arabicPeriod"/>
+            </a:pPr>
             <a:endParaRPr lang="en-IN" dirty="0"/>
           </a:p>
         </p:txBody>
@@ -3549,6 +3574,113 @@
     <p:extLst>
       <p:ext uri="{BB962C8B-B14F-4D97-AF65-F5344CB8AC3E}">
         <p14:creationId xmlns:p14="http://schemas.microsoft.com/office/powerpoint/2010/main" val="1186223880"/>
+      </p:ext>
+    </p:extLst>
+  </p:cSld>
+  <p:clrMapOvr>
+    <a:masterClrMapping/>
+  </p:clrMapOvr>
+</p:sld>
+</file>
+
+<file path=ppt/slides/slide3.xml><?xml version="1.0" encoding="utf-8"?>
+<p:sld xmlns:a="http://schemas.openxmlformats.org/drawingml/2006/main" xmlns:r="http://schemas.openxmlformats.org/officeDocument/2006/relationships" xmlns:p="http://schemas.openxmlformats.org/presentationml/2006/main">
+  <p:cSld>
+    <p:spTree>
+      <p:nvGrpSpPr>
+        <p:cNvPr id="1" name=""/>
+        <p:cNvGrpSpPr/>
+        <p:nvPr/>
+      </p:nvGrpSpPr>
+      <p:grpSpPr>
+        <a:xfrm>
+          <a:off x="0" y="0"/>
+          <a:ext cx="0" cy="0"/>
+          <a:chOff x="0" y="0"/>
+          <a:chExt cx="0" cy="0"/>
+        </a:xfrm>
+      </p:grpSpPr>
+      <p:sp>
+        <p:nvSpPr>
+          <p:cNvPr id="2" name="Title 1">
+            <a:extLst>
+              <a:ext uri="{FF2B5EF4-FFF2-40B4-BE49-F238E27FC236}">
+                <a16:creationId xmlns:a16="http://schemas.microsoft.com/office/drawing/2014/main" id="{245EA4D0-A18C-4DF8-9C7B-8E5D52E1A2E2}"/>
+              </a:ext>
+            </a:extLst>
+          </p:cNvPr>
+          <p:cNvSpPr>
+            <a:spLocks noGrp="1"/>
+          </p:cNvSpPr>
+          <p:nvPr>
+            <p:ph type="title"/>
+          </p:nvPr>
+        </p:nvSpPr>
+        <p:spPr/>
+        <p:txBody>
+          <a:bodyPr/>
+          <a:lstStyle/>
+          <a:p>
+            <a:r>
+              <a:rPr lang="en-IN" dirty="0"/>
+              <a:t>4-creating-component requirements</a:t>
+            </a:r>
+          </a:p>
+        </p:txBody>
+      </p:sp>
+      <p:sp>
+        <p:nvSpPr>
+          <p:cNvPr id="3" name="Content Placeholder 2">
+            <a:extLst>
+              <a:ext uri="{FF2B5EF4-FFF2-40B4-BE49-F238E27FC236}">
+                <a16:creationId xmlns:a16="http://schemas.microsoft.com/office/drawing/2014/main" id="{D29AD365-0ACF-4E6D-BF59-5B6A80CA6CCF}"/>
+              </a:ext>
+            </a:extLst>
+          </p:cNvPr>
+          <p:cNvSpPr>
+            <a:spLocks noGrp="1"/>
+          </p:cNvSpPr>
+          <p:nvPr>
+            <p:ph idx="1"/>
+          </p:nvPr>
+        </p:nvSpPr>
+        <p:spPr/>
+        <p:txBody>
+          <a:bodyPr/>
+          <a:lstStyle/>
+          <a:p>
+            <a:pPr marL="514350" indent="-514350">
+              <a:buFont typeface="+mj-lt"/>
+              <a:buAutoNum type="arabicPeriod"/>
+            </a:pPr>
+            <a:r>
+              <a:rPr lang="en-IN" dirty="0"/>
+              <a:t>Implement INTERFACE for a Product object.</a:t>
+            </a:r>
+          </a:p>
+          <a:p>
+            <a:pPr marL="514350" indent="-514350">
+              <a:buFont typeface="+mj-lt"/>
+              <a:buAutoNum type="arabicPeriod"/>
+            </a:pPr>
+            <a:r>
+              <a:rPr lang="en-IN"/>
+              <a:t>Implement Filter</a:t>
+            </a:r>
+          </a:p>
+          <a:p>
+            <a:pPr marL="514350" indent="-514350">
+              <a:buFont typeface="+mj-lt"/>
+              <a:buAutoNum type="arabicPeriod"/>
+            </a:pPr>
+            <a:endParaRPr lang="en-IN" dirty="0"/>
+          </a:p>
+        </p:txBody>
+      </p:sp>
+    </p:spTree>
+    <p:extLst>
+      <p:ext uri="{BB962C8B-B14F-4D97-AF65-F5344CB8AC3E}">
+        <p14:creationId xmlns:p14="http://schemas.microsoft.com/office/powerpoint/2010/main" val="2048167590"/>
       </p:ext>
     </p:extLst>
   </p:cSld>

</xml_diff>